<commit_message>
added prezi and updated document
</commit_message>
<xml_diff>
--- a/Office documents/Prezentare Scurta.pptx
+++ b/Office documents/Prezentare Scurta.pptx
@@ -374,7 +374,7 @@
             <a:fld id="{DC32BC8C-447D-48B7-85E7-C44104B6F7C5}" type="datetimeFigureOut">
               <a:rPr lang="en-US" smtClean="0"/>
               <a:pPr/>
-              <a:t>7/5/2010</a:t>
+              <a:t>7/6/2010</a:t>
             </a:fld>
             <a:endParaRPr lang="en-US"/>
           </a:p>
@@ -551,7 +551,7 @@
             <a:fld id="{DC32BC8C-447D-48B7-85E7-C44104B6F7C5}" type="datetimeFigureOut">
               <a:rPr lang="en-US" smtClean="0"/>
               <a:pPr/>
-              <a:t>7/5/2010</a:t>
+              <a:t>7/6/2010</a:t>
             </a:fld>
             <a:endParaRPr lang="en-US"/>
           </a:p>
@@ -677,7 +677,7 @@
             <a:fld id="{DC32BC8C-447D-48B7-85E7-C44104B6F7C5}" type="datetimeFigureOut">
               <a:rPr lang="en-US" smtClean="0"/>
               <a:pPr/>
-              <a:t>7/5/2010</a:t>
+              <a:t>7/6/2010</a:t>
             </a:fld>
             <a:endParaRPr lang="en-US"/>
           </a:p>
@@ -769,7 +769,7 @@
             <a:fld id="{DC32BC8C-447D-48B7-85E7-C44104B6F7C5}" type="datetimeFigureOut">
               <a:rPr lang="en-US" smtClean="0"/>
               <a:pPr/>
-              <a:t>7/5/2010</a:t>
+              <a:t>7/6/2010</a:t>
             </a:fld>
             <a:endParaRPr lang="en-US"/>
           </a:p>
@@ -1007,7 +1007,7 @@
             <a:fld id="{DC32BC8C-447D-48B7-85E7-C44104B6F7C5}" type="datetimeFigureOut">
               <a:rPr lang="en-US" smtClean="0"/>
               <a:pPr/>
-              <a:t>7/5/2010</a:t>
+              <a:t>7/6/2010</a:t>
             </a:fld>
             <a:endParaRPr lang="en-US"/>
           </a:p>
@@ -1184,7 +1184,7 @@
             <a:fld id="{DC32BC8C-447D-48B7-85E7-C44104B6F7C5}" type="datetimeFigureOut">
               <a:rPr lang="en-US" smtClean="0"/>
               <a:pPr/>
-              <a:t>7/5/2010</a:t>
+              <a:t>7/6/2010</a:t>
             </a:fld>
             <a:endParaRPr lang="en-US"/>
           </a:p>
@@ -1422,7 +1422,7 @@
             <a:fld id="{DC32BC8C-447D-48B7-85E7-C44104B6F7C5}" type="datetimeFigureOut">
               <a:rPr lang="en-US" smtClean="0"/>
               <a:pPr/>
-              <a:t>7/5/2010</a:t>
+              <a:t>7/6/2010</a:t>
             </a:fld>
             <a:endParaRPr lang="en-US"/>
           </a:p>
@@ -1695,7 +1695,7 @@
             <a:fld id="{DC32BC8C-447D-48B7-85E7-C44104B6F7C5}" type="datetimeFigureOut">
               <a:rPr lang="en-US" smtClean="0"/>
               <a:pPr/>
-              <a:t>7/5/2010</a:t>
+              <a:t>7/6/2010</a:t>
             </a:fld>
             <a:endParaRPr lang="en-US"/>
           </a:p>
@@ -1994,7 +1994,67 @@
                 <a:latin typeface="Times New Roman" pitchFamily="18" charset="0"/>
                 <a:cs typeface="Times New Roman" pitchFamily="18" charset="0"/>
               </a:rPr>
-              <a:t>Sistem de simulare si testare automata a functionalitatilor unui computer de bord</a:t>
+              <a:t>Sistem de simulare </a:t>
+            </a:r>
+            <a:r>
+              <a:rPr lang="ro-RO" b="1" noProof="1" smtClean="0">
+                <a:solidFill>
+                  <a:schemeClr val="bg1"/>
+                </a:solidFill>
+                <a:latin typeface="Times New Roman" pitchFamily="18" charset="0"/>
+                <a:cs typeface="Times New Roman" pitchFamily="18" charset="0"/>
+              </a:rPr>
+              <a:t>şi </a:t>
+            </a:r>
+            <a:r>
+              <a:rPr lang="ro-RO" b="1" noProof="1" smtClean="0">
+                <a:solidFill>
+                  <a:schemeClr val="bg1"/>
+                </a:solidFill>
+                <a:latin typeface="Times New Roman" pitchFamily="18" charset="0"/>
+                <a:cs typeface="Times New Roman" pitchFamily="18" charset="0"/>
+              </a:rPr>
+              <a:t>testare </a:t>
+            </a:r>
+            <a:r>
+              <a:rPr lang="ro-RO" b="1" noProof="1" smtClean="0">
+                <a:solidFill>
+                  <a:schemeClr val="bg1"/>
+                </a:solidFill>
+                <a:latin typeface="Times New Roman" pitchFamily="18" charset="0"/>
+                <a:cs typeface="Times New Roman" pitchFamily="18" charset="0"/>
+              </a:rPr>
+              <a:t>automată </a:t>
+            </a:r>
+            <a:r>
+              <a:rPr lang="ro-RO" b="1" noProof="1" smtClean="0">
+                <a:solidFill>
+                  <a:schemeClr val="bg1"/>
+                </a:solidFill>
+                <a:latin typeface="Times New Roman" pitchFamily="18" charset="0"/>
+                <a:cs typeface="Times New Roman" pitchFamily="18" charset="0"/>
+              </a:rPr>
+              <a:t>a </a:t>
+            </a:r>
+            <a:r>
+              <a:rPr lang="ro-RO" b="1" noProof="1" smtClean="0">
+                <a:solidFill>
+                  <a:schemeClr val="bg1"/>
+                </a:solidFill>
+                <a:latin typeface="Times New Roman" pitchFamily="18" charset="0"/>
+                <a:cs typeface="Times New Roman" pitchFamily="18" charset="0"/>
+              </a:rPr>
+              <a:t>funcţionalităţilor </a:t>
+            </a:r>
+            <a:r>
+              <a:rPr lang="ro-RO" b="1" noProof="1" smtClean="0">
+                <a:solidFill>
+                  <a:schemeClr val="bg1"/>
+                </a:solidFill>
+                <a:latin typeface="Times New Roman" pitchFamily="18" charset="0"/>
+                <a:cs typeface="Times New Roman" pitchFamily="18" charset="0"/>
+              </a:rPr>
+              <a:t>unui computer de bord</a:t>
             </a:r>
             <a:endParaRPr lang="ro-RO" b="1" noProof="1">
               <a:solidFill>
@@ -2080,7 +2140,21 @@
                 <a:latin typeface="Times New Roman" pitchFamily="18" charset="0"/>
                 <a:cs typeface="Times New Roman" pitchFamily="18" charset="0"/>
               </a:rPr>
-              <a:t>Inlocuirea AWT cu Swing</a:t>
+              <a:t>Î</a:t>
+            </a:r>
+            <a:r>
+              <a:rPr lang="ro-RO" b="1" noProof="1" smtClean="0">
+                <a:latin typeface="Times New Roman" pitchFamily="18" charset="0"/>
+                <a:cs typeface="Times New Roman" pitchFamily="18" charset="0"/>
+              </a:rPr>
+              <a:t>nlocuirea </a:t>
+            </a:r>
+            <a:r>
+              <a:rPr lang="ro-RO" b="1" noProof="1" smtClean="0">
+                <a:latin typeface="Times New Roman" pitchFamily="18" charset="0"/>
+                <a:cs typeface="Times New Roman" pitchFamily="18" charset="0"/>
+              </a:rPr>
+              <a:t>AWT cu Swing</a:t>
             </a:r>
             <a:endParaRPr lang="en-US" b="1" noProof="1" smtClean="0">
               <a:latin typeface="Times New Roman" pitchFamily="18" charset="0"/>
@@ -2099,7 +2173,28 @@
                 <a:latin typeface="Times New Roman" pitchFamily="18" charset="0"/>
                 <a:cs typeface="Times New Roman" pitchFamily="18" charset="0"/>
               </a:rPr>
-              <a:t>Interfata cu utilizatorul</a:t>
+              <a:t>Interfa</a:t>
+            </a:r>
+            <a:r>
+              <a:rPr lang="ro-RO" b="1" noProof="1" smtClean="0">
+                <a:latin typeface="Times New Roman" pitchFamily="18" charset="0"/>
+                <a:cs typeface="Times New Roman" pitchFamily="18" charset="0"/>
+              </a:rPr>
+              <a:t>ţ</a:t>
+            </a:r>
+            <a:r>
+              <a:rPr lang="en-US" b="1" noProof="1" smtClean="0">
+                <a:latin typeface="Times New Roman" pitchFamily="18" charset="0"/>
+                <a:cs typeface="Times New Roman" pitchFamily="18" charset="0"/>
+              </a:rPr>
+              <a:t>a </a:t>
+            </a:r>
+            <a:r>
+              <a:rPr lang="en-US" b="1" noProof="1" smtClean="0">
+                <a:latin typeface="Times New Roman" pitchFamily="18" charset="0"/>
+                <a:cs typeface="Times New Roman" pitchFamily="18" charset="0"/>
+              </a:rPr>
+              <a:t>cu utilizatorul</a:t>
             </a:r>
           </a:p>
           <a:p>
@@ -2266,7 +2361,35 @@
                 <a:latin typeface="Times New Roman" pitchFamily="18" charset="0"/>
                 <a:cs typeface="Times New Roman" pitchFamily="18" charset="0"/>
               </a:rPr>
-              <a:t>O vedere generala asupra proiectului poate fi descrisa de figura de mai jos, in care sunt prezentate 4 componente principale denumite generic </a:t>
+              <a:t>O vedere generala asupra proiectului poate fi </a:t>
+            </a:r>
+            <a:r>
+              <a:rPr lang="ro-RO" sz="2400" noProof="1" smtClean="0">
+                <a:latin typeface="Times New Roman" pitchFamily="18" charset="0"/>
+                <a:cs typeface="Times New Roman" pitchFamily="18" charset="0"/>
+              </a:rPr>
+              <a:t>descrisă </a:t>
+            </a:r>
+            <a:r>
+              <a:rPr lang="ro-RO" sz="2400" noProof="1" smtClean="0">
+                <a:latin typeface="Times New Roman" pitchFamily="18" charset="0"/>
+                <a:cs typeface="Times New Roman" pitchFamily="18" charset="0"/>
+              </a:rPr>
+              <a:t>de figura de mai jos, </a:t>
+            </a:r>
+            <a:r>
+              <a:rPr lang="ro-RO" sz="2400" noProof="1" smtClean="0">
+                <a:latin typeface="Times New Roman" pitchFamily="18" charset="0"/>
+                <a:cs typeface="Times New Roman" pitchFamily="18" charset="0"/>
+              </a:rPr>
+              <a:t>în </a:t>
+            </a:r>
+            <a:r>
+              <a:rPr lang="ro-RO" sz="2400" noProof="1" smtClean="0">
+                <a:latin typeface="Times New Roman" pitchFamily="18" charset="0"/>
+                <a:cs typeface="Times New Roman" pitchFamily="18" charset="0"/>
+              </a:rPr>
+              <a:t>care sunt prezentate 4 componente principale denumite generic </a:t>
             </a:r>
             <a:r>
               <a:rPr lang="ro-RO" sz="2400" b="1" noProof="1" smtClean="0">
@@ -2287,7 +2410,14 @@
                 <a:latin typeface="Times New Roman" pitchFamily="18" charset="0"/>
                 <a:cs typeface="Times New Roman" pitchFamily="18" charset="0"/>
               </a:rPr>
-              <a:t>Interfata cu utilizatorul</a:t>
+              <a:t>Interfaţa </a:t>
+            </a:r>
+            <a:r>
+              <a:rPr lang="ro-RO" sz="2400" b="1" noProof="1" smtClean="0">
+                <a:latin typeface="Times New Roman" pitchFamily="18" charset="0"/>
+                <a:cs typeface="Times New Roman" pitchFamily="18" charset="0"/>
+              </a:rPr>
+              <a:t>cu utilizatorul</a:t>
             </a:r>
             <a:r>
               <a:rPr lang="ro-RO" sz="2400" noProof="1" smtClean="0">
@@ -2871,7 +3001,28 @@
                 <a:latin typeface="Times New Roman" pitchFamily="18" charset="0"/>
                 <a:cs typeface="Times New Roman" pitchFamily="18" charset="0"/>
               </a:rPr>
-              <a:t>Atributii principale:</a:t>
+              <a:t>Atribu</a:t>
+            </a:r>
+            <a:r>
+              <a:rPr lang="ro-RO" b="1" noProof="1" smtClean="0">
+                <a:latin typeface="Times New Roman" pitchFamily="18" charset="0"/>
+                <a:cs typeface="Times New Roman" pitchFamily="18" charset="0"/>
+              </a:rPr>
+              <a:t>ţ</a:t>
+            </a:r>
+            <a:r>
+              <a:rPr lang="en-US" b="1" noProof="1" smtClean="0">
+                <a:latin typeface="Times New Roman" pitchFamily="18" charset="0"/>
+                <a:cs typeface="Times New Roman" pitchFamily="18" charset="0"/>
+              </a:rPr>
+              <a:t>ii </a:t>
+            </a:r>
+            <a:r>
+              <a:rPr lang="en-US" b="1" noProof="1" smtClean="0">
+                <a:latin typeface="Times New Roman" pitchFamily="18" charset="0"/>
+                <a:cs typeface="Times New Roman" pitchFamily="18" charset="0"/>
+              </a:rPr>
+              <a:t>principale:</a:t>
             </a:r>
           </a:p>
           <a:p>
@@ -2881,7 +3032,42 @@
                 <a:latin typeface="Times New Roman" pitchFamily="18" charset="0"/>
                 <a:cs typeface="Times New Roman" pitchFamily="18" charset="0"/>
               </a:rPr>
-              <a:t>calculul de coordonate in spatiul de lucru al componentelor Swing</a:t>
+              <a:t>calculul de coordonate </a:t>
+            </a:r>
+            <a:r>
+              <a:rPr lang="ro-RO" noProof="1" smtClean="0">
+                <a:latin typeface="Times New Roman" pitchFamily="18" charset="0"/>
+                <a:cs typeface="Times New Roman" pitchFamily="18" charset="0"/>
+              </a:rPr>
+              <a:t>î</a:t>
+            </a:r>
+            <a:r>
+              <a:rPr lang="en-US" noProof="1" smtClean="0">
+                <a:latin typeface="Times New Roman" pitchFamily="18" charset="0"/>
+                <a:cs typeface="Times New Roman" pitchFamily="18" charset="0"/>
+              </a:rPr>
+              <a:t>n spa</a:t>
+            </a:r>
+            <a:r>
+              <a:rPr lang="ro-RO" noProof="1" smtClean="0">
+                <a:latin typeface="Times New Roman" pitchFamily="18" charset="0"/>
+                <a:cs typeface="Times New Roman" pitchFamily="18" charset="0"/>
+              </a:rPr>
+              <a:t>ţ</a:t>
+            </a:r>
+            <a:r>
+              <a:rPr lang="en-US" noProof="1" smtClean="0">
+                <a:latin typeface="Times New Roman" pitchFamily="18" charset="0"/>
+                <a:cs typeface="Times New Roman" pitchFamily="18" charset="0"/>
+              </a:rPr>
+              <a:t>iul </a:t>
+            </a:r>
+            <a:r>
+              <a:rPr lang="en-US" noProof="1" smtClean="0">
+                <a:latin typeface="Times New Roman" pitchFamily="18" charset="0"/>
+                <a:cs typeface="Times New Roman" pitchFamily="18" charset="0"/>
+              </a:rPr>
+              <a:t>de lucru al componentelor Swing</a:t>
             </a:r>
           </a:p>
           <a:p>
@@ -2891,8 +3077,33 @@
                 <a:latin typeface="Times New Roman" pitchFamily="18" charset="0"/>
                 <a:cs typeface="Times New Roman" pitchFamily="18" charset="0"/>
               </a:rPr>
-              <a:t>desenarea interfetei</a:t>
-            </a:r>
+              <a:t>desenarea </a:t>
+            </a:r>
+            <a:r>
+              <a:rPr lang="en-US" noProof="1" smtClean="0">
+                <a:latin typeface="Times New Roman" pitchFamily="18" charset="0"/>
+                <a:cs typeface="Times New Roman" pitchFamily="18" charset="0"/>
+              </a:rPr>
+              <a:t>interfe</a:t>
+            </a:r>
+            <a:r>
+              <a:rPr lang="ro-RO" noProof="1" smtClean="0">
+                <a:latin typeface="Times New Roman" pitchFamily="18" charset="0"/>
+                <a:cs typeface="Times New Roman" pitchFamily="18" charset="0"/>
+              </a:rPr>
+              <a:t>ţ</a:t>
+            </a:r>
+            <a:r>
+              <a:rPr lang="en-US" noProof="1" smtClean="0">
+                <a:latin typeface="Times New Roman" pitchFamily="18" charset="0"/>
+                <a:cs typeface="Times New Roman" pitchFamily="18" charset="0"/>
+              </a:rPr>
+              <a:t>ei</a:t>
+            </a:r>
+            <a:endParaRPr lang="en-US" noProof="1" smtClean="0">
+              <a:latin typeface="Times New Roman" pitchFamily="18" charset="0"/>
+              <a:cs typeface="Times New Roman" pitchFamily="18" charset="0"/>
+            </a:endParaRPr>
           </a:p>
           <a:p>
             <a:pPr lvl="1"/>
@@ -2901,7 +3112,63 @@
                 <a:latin typeface="Times New Roman" pitchFamily="18" charset="0"/>
                 <a:cs typeface="Times New Roman" pitchFamily="18" charset="0"/>
               </a:rPr>
-              <a:t>calculul marimilor de interes (viteza, turatie etc.) </a:t>
+              <a:t>calculul </a:t>
+            </a:r>
+            <a:r>
+              <a:rPr lang="en-US" noProof="1" smtClean="0">
+                <a:latin typeface="Times New Roman" pitchFamily="18" charset="0"/>
+                <a:cs typeface="Times New Roman" pitchFamily="18" charset="0"/>
+              </a:rPr>
+              <a:t>m</a:t>
+            </a:r>
+            <a:r>
+              <a:rPr lang="ro-RO" noProof="1" smtClean="0">
+                <a:latin typeface="Times New Roman" pitchFamily="18" charset="0"/>
+                <a:cs typeface="Times New Roman" pitchFamily="18" charset="0"/>
+              </a:rPr>
+              <a:t>ă</a:t>
+            </a:r>
+            <a:r>
+              <a:rPr lang="en-US" noProof="1" smtClean="0">
+                <a:latin typeface="Times New Roman" pitchFamily="18" charset="0"/>
+                <a:cs typeface="Times New Roman" pitchFamily="18" charset="0"/>
+              </a:rPr>
+              <a:t>rimilor </a:t>
+            </a:r>
+            <a:r>
+              <a:rPr lang="en-US" noProof="1" smtClean="0">
+                <a:latin typeface="Times New Roman" pitchFamily="18" charset="0"/>
+                <a:cs typeface="Times New Roman" pitchFamily="18" charset="0"/>
+              </a:rPr>
+              <a:t>de interes (viteza, </a:t>
+            </a:r>
+            <a:r>
+              <a:rPr lang="en-US" noProof="1" smtClean="0">
+                <a:latin typeface="Times New Roman" pitchFamily="18" charset="0"/>
+                <a:cs typeface="Times New Roman" pitchFamily="18" charset="0"/>
+              </a:rPr>
+              <a:t>tura</a:t>
+            </a:r>
+            <a:r>
+              <a:rPr lang="ro-RO" noProof="1" smtClean="0">
+                <a:latin typeface="Times New Roman" pitchFamily="18" charset="0"/>
+                <a:cs typeface="Times New Roman" pitchFamily="18" charset="0"/>
+              </a:rPr>
+              <a:t>ţ</a:t>
+            </a:r>
+            <a:r>
+              <a:rPr lang="en-US" noProof="1" smtClean="0">
+                <a:latin typeface="Times New Roman" pitchFamily="18" charset="0"/>
+                <a:cs typeface="Times New Roman" pitchFamily="18" charset="0"/>
+              </a:rPr>
+              <a:t>ie </a:t>
+            </a:r>
+            <a:r>
+              <a:rPr lang="en-US" noProof="1" smtClean="0">
+                <a:latin typeface="Times New Roman" pitchFamily="18" charset="0"/>
+                <a:cs typeface="Times New Roman" pitchFamily="18" charset="0"/>
+              </a:rPr>
+              <a:t>etc.) </a:t>
             </a:r>
           </a:p>
           <a:p>
@@ -2926,12 +3193,79 @@
           <a:p>
             <a:pPr lvl="1"/>
             <a:r>
+              <a:rPr lang="ro-RO" noProof="1" smtClean="0">
+                <a:latin typeface="Times New Roman" pitchFamily="18" charset="0"/>
+                <a:cs typeface="Times New Roman" pitchFamily="18" charset="0"/>
+              </a:rPr>
+              <a:t>Î</a:t>
+            </a:r>
+            <a:r>
               <a:rPr lang="en-US" noProof="1" smtClean="0">
                 <a:latin typeface="Times New Roman" pitchFamily="18" charset="0"/>
                 <a:cs typeface="Times New Roman" pitchFamily="18" charset="0"/>
               </a:rPr>
-              <a:t>Impartirea in zone a interfetei</a:t>
-            </a:r>
+              <a:t>mpar</a:t>
+            </a:r>
+            <a:r>
+              <a:rPr lang="ro-RO" noProof="1" smtClean="0">
+                <a:latin typeface="Times New Roman" pitchFamily="18" charset="0"/>
+                <a:cs typeface="Times New Roman" pitchFamily="18" charset="0"/>
+              </a:rPr>
+              <a:t>ţ</a:t>
+            </a:r>
+            <a:r>
+              <a:rPr lang="en-US" noProof="1" smtClean="0">
+                <a:latin typeface="Times New Roman" pitchFamily="18" charset="0"/>
+                <a:cs typeface="Times New Roman" pitchFamily="18" charset="0"/>
+              </a:rPr>
+              <a:t>irea </a:t>
+            </a:r>
+            <a:r>
+              <a:rPr lang="ro-RO" noProof="1" smtClean="0">
+                <a:latin typeface="Times New Roman" pitchFamily="18" charset="0"/>
+                <a:cs typeface="Times New Roman" pitchFamily="18" charset="0"/>
+              </a:rPr>
+              <a:t>î</a:t>
+            </a:r>
+            <a:r>
+              <a:rPr lang="en-US" noProof="1" smtClean="0">
+                <a:latin typeface="Times New Roman" pitchFamily="18" charset="0"/>
+                <a:cs typeface="Times New Roman" pitchFamily="18" charset="0"/>
+              </a:rPr>
+              <a:t>n </a:t>
+            </a:r>
+            <a:r>
+              <a:rPr lang="en-US" noProof="1" smtClean="0">
+                <a:latin typeface="Times New Roman" pitchFamily="18" charset="0"/>
+                <a:cs typeface="Times New Roman" pitchFamily="18" charset="0"/>
+              </a:rPr>
+              <a:t>zone a </a:t>
+            </a:r>
+            <a:r>
+              <a:rPr lang="en-US" noProof="1" smtClean="0">
+                <a:latin typeface="Times New Roman" pitchFamily="18" charset="0"/>
+                <a:cs typeface="Times New Roman" pitchFamily="18" charset="0"/>
+              </a:rPr>
+              <a:t>interfe</a:t>
+            </a:r>
+            <a:r>
+              <a:rPr lang="ro-RO" noProof="1" smtClean="0">
+                <a:latin typeface="Times New Roman" pitchFamily="18" charset="0"/>
+                <a:cs typeface="Times New Roman" pitchFamily="18" charset="0"/>
+              </a:rPr>
+              <a:t>ţ</a:t>
+            </a:r>
+            <a:r>
+              <a:rPr lang="en-US" noProof="1" smtClean="0">
+                <a:latin typeface="Times New Roman" pitchFamily="18" charset="0"/>
+                <a:cs typeface="Times New Roman" pitchFamily="18" charset="0"/>
+              </a:rPr>
+              <a:t>ei</a:t>
+            </a:r>
+            <a:endParaRPr lang="en-US" noProof="1" smtClean="0">
+              <a:latin typeface="Times New Roman" pitchFamily="18" charset="0"/>
+              <a:cs typeface="Times New Roman" pitchFamily="18" charset="0"/>
+            </a:endParaRPr>
           </a:p>
           <a:p>
             <a:pPr lvl="1"/>
@@ -2940,8 +3274,26 @@
                 <a:latin typeface="Times New Roman" pitchFamily="18" charset="0"/>
                 <a:cs typeface="Times New Roman" pitchFamily="18" charset="0"/>
               </a:rPr>
-              <a:t>Regresia polinomiala</a:t>
-            </a:r>
+              <a:t>Regresia </a:t>
+            </a:r>
+            <a:r>
+              <a:rPr lang="en-US" noProof="1" smtClean="0">
+                <a:latin typeface="Times New Roman" pitchFamily="18" charset="0"/>
+                <a:cs typeface="Times New Roman" pitchFamily="18" charset="0"/>
+              </a:rPr>
+              <a:t>polinomial</a:t>
+            </a:r>
+            <a:r>
+              <a:rPr lang="ro-RO" noProof="1" smtClean="0">
+                <a:latin typeface="Times New Roman" pitchFamily="18" charset="0"/>
+                <a:cs typeface="Times New Roman" pitchFamily="18" charset="0"/>
+              </a:rPr>
+              <a:t>ă</a:t>
+            </a:r>
+            <a:endParaRPr lang="en-US" noProof="1" smtClean="0">
+              <a:latin typeface="Times New Roman" pitchFamily="18" charset="0"/>
+              <a:cs typeface="Times New Roman" pitchFamily="18" charset="0"/>
+            </a:endParaRPr>
           </a:p>
           <a:p>
             <a:pPr lvl="1"/>
@@ -3086,11 +3438,53 @@
           </a:p>
           <a:p>
             <a:r>
+              <a:rPr lang="ro-RO" b="1" noProof="1" smtClean="0">
+                <a:latin typeface="Times New Roman" pitchFamily="18" charset="0"/>
+                <a:cs typeface="Times New Roman" pitchFamily="18" charset="0"/>
+              </a:rPr>
+              <a:t>Î</a:t>
+            </a:r>
+            <a:r>
               <a:rPr lang="en-US" b="1" noProof="1" smtClean="0">
                 <a:latin typeface="Times New Roman" pitchFamily="18" charset="0"/>
                 <a:cs typeface="Times New Roman" pitchFamily="18" charset="0"/>
               </a:rPr>
-              <a:t>Impartirea in zone a simulatorului</a:t>
+              <a:t>mpar</a:t>
+            </a:r>
+            <a:r>
+              <a:rPr lang="ro-RO" b="1" noProof="1" smtClean="0">
+                <a:latin typeface="Times New Roman" pitchFamily="18" charset="0"/>
+                <a:cs typeface="Times New Roman" pitchFamily="18" charset="0"/>
+              </a:rPr>
+              <a:t>ţ</a:t>
+            </a:r>
+            <a:r>
+              <a:rPr lang="en-US" b="1" noProof="1" smtClean="0">
+                <a:latin typeface="Times New Roman" pitchFamily="18" charset="0"/>
+                <a:cs typeface="Times New Roman" pitchFamily="18" charset="0"/>
+              </a:rPr>
+              <a:t>irea </a:t>
+            </a:r>
+            <a:r>
+              <a:rPr lang="ro-RO" b="1" noProof="1" smtClean="0">
+                <a:latin typeface="Times New Roman" pitchFamily="18" charset="0"/>
+                <a:cs typeface="Times New Roman" pitchFamily="18" charset="0"/>
+              </a:rPr>
+              <a:t>î</a:t>
+            </a:r>
+            <a:r>
+              <a:rPr lang="en-US" b="1" noProof="1" smtClean="0">
+                <a:latin typeface="Times New Roman" pitchFamily="18" charset="0"/>
+                <a:cs typeface="Times New Roman" pitchFamily="18" charset="0"/>
+              </a:rPr>
+              <a:t>n </a:t>
+            </a:r>
+            <a:r>
+              <a:rPr lang="en-US" b="1" noProof="1" smtClean="0">
+                <a:latin typeface="Times New Roman" pitchFamily="18" charset="0"/>
+                <a:cs typeface="Times New Roman" pitchFamily="18" charset="0"/>
+              </a:rPr>
+              <a:t>zone a simulatorului</a:t>
             </a:r>
           </a:p>
           <a:p>
@@ -3125,8 +3519,26 @@
                 <a:latin typeface="Times New Roman" pitchFamily="18" charset="0"/>
                 <a:cs typeface="Times New Roman" pitchFamily="18" charset="0"/>
               </a:rPr>
-              <a:t>Regresia polinomiala</a:t>
-            </a:r>
+              <a:t>Regresia </a:t>
+            </a:r>
+            <a:r>
+              <a:rPr lang="en-US" b="1" noProof="1" smtClean="0">
+                <a:latin typeface="Times New Roman" pitchFamily="18" charset="0"/>
+                <a:cs typeface="Times New Roman" pitchFamily="18" charset="0"/>
+              </a:rPr>
+              <a:t>polinomial</a:t>
+            </a:r>
+            <a:r>
+              <a:rPr lang="ro-RO" b="1" noProof="1" smtClean="0">
+                <a:latin typeface="Times New Roman" pitchFamily="18" charset="0"/>
+                <a:cs typeface="Times New Roman" pitchFamily="18" charset="0"/>
+              </a:rPr>
+              <a:t>ă</a:t>
+            </a:r>
+            <a:endParaRPr lang="en-US" b="1" noProof="1" smtClean="0">
+              <a:latin typeface="Times New Roman" pitchFamily="18" charset="0"/>
+              <a:cs typeface="Times New Roman" pitchFamily="18" charset="0"/>
+            </a:endParaRPr>
           </a:p>
           <a:p>
             <a:endParaRPr lang="en-US" noProof="1" smtClean="0">
@@ -3698,7 +4110,35 @@
                 <a:latin typeface="Times New Roman" pitchFamily="18" charset="0"/>
                 <a:cs typeface="Times New Roman" pitchFamily="18" charset="0"/>
               </a:rPr>
-              <a:t>Exemplu de vedere arborescenta a clasei </a:t>
+              <a:t>Exemplu de vedere </a:t>
+            </a:r>
+            <a:r>
+              <a:rPr lang="en-US" sz="2400" b="1" noProof="1" smtClean="0">
+                <a:latin typeface="Times New Roman" pitchFamily="18" charset="0"/>
+                <a:cs typeface="Times New Roman" pitchFamily="18" charset="0"/>
+              </a:rPr>
+              <a:t>arborescent</a:t>
+            </a:r>
+            <a:r>
+              <a:rPr lang="ro-RO" sz="2400" b="1" noProof="1" smtClean="0">
+                <a:latin typeface="Times New Roman" pitchFamily="18" charset="0"/>
+                <a:cs typeface="Times New Roman" pitchFamily="18" charset="0"/>
+              </a:rPr>
+              <a:t>ă</a:t>
+            </a:r>
+            <a:r>
+              <a:rPr lang="en-US" sz="2400" b="1" noProof="1" smtClean="0">
+                <a:latin typeface="Times New Roman" pitchFamily="18" charset="0"/>
+                <a:cs typeface="Times New Roman" pitchFamily="18" charset="0"/>
+              </a:rPr>
+              <a:t> </a:t>
+            </a:r>
+            <a:r>
+              <a:rPr lang="en-US" sz="2400" b="1" noProof="1" smtClean="0">
+                <a:latin typeface="Times New Roman" pitchFamily="18" charset="0"/>
+                <a:cs typeface="Times New Roman" pitchFamily="18" charset="0"/>
+              </a:rPr>
+              <a:t>a clasei </a:t>
             </a:r>
           </a:p>
           <a:p>
@@ -3926,15 +4366,120 @@
                 <a:latin typeface="Times New Roman" pitchFamily="18" charset="0"/>
                 <a:cs typeface="Times New Roman" pitchFamily="18" charset="0"/>
               </a:rPr>
-              <a:t>Componenta a aplicatiei parte a functionarii automate</a:t>
-            </a:r>
-          </a:p>
-          <a:p>
+              <a:t>Component</a:t>
+            </a:r>
+            <a:r>
+              <a:rPr lang="ro-RO" sz="2400" b="1" noProof="1" smtClean="0">
+                <a:latin typeface="Times New Roman" pitchFamily="18" charset="0"/>
+                <a:cs typeface="Times New Roman" pitchFamily="18" charset="0"/>
+              </a:rPr>
+              <a:t>ă</a:t>
+            </a:r>
             <a:r>
               <a:rPr lang="en-US" sz="2400" b="1" noProof="1" smtClean="0">
                 <a:latin typeface="Times New Roman" pitchFamily="18" charset="0"/>
                 <a:cs typeface="Times New Roman" pitchFamily="18" charset="0"/>
               </a:rPr>
+              <a:t> </a:t>
+            </a:r>
+            <a:r>
+              <a:rPr lang="en-US" sz="2400" b="1" noProof="1" smtClean="0">
+                <a:latin typeface="Times New Roman" pitchFamily="18" charset="0"/>
+                <a:cs typeface="Times New Roman" pitchFamily="18" charset="0"/>
+              </a:rPr>
+              <a:t>a </a:t>
+            </a:r>
+            <a:r>
+              <a:rPr lang="en-US" sz="2400" b="1" noProof="1" smtClean="0">
+                <a:latin typeface="Times New Roman" pitchFamily="18" charset="0"/>
+                <a:cs typeface="Times New Roman" pitchFamily="18" charset="0"/>
+              </a:rPr>
+              <a:t>aplica</a:t>
+            </a:r>
+            <a:r>
+              <a:rPr lang="ro-RO" sz="2400" b="1" noProof="1" smtClean="0">
+                <a:latin typeface="Times New Roman" pitchFamily="18" charset="0"/>
+                <a:cs typeface="Times New Roman" pitchFamily="18" charset="0"/>
+              </a:rPr>
+              <a:t>ţ</a:t>
+            </a:r>
+            <a:r>
+              <a:rPr lang="en-US" sz="2400" b="1" noProof="1" smtClean="0">
+                <a:latin typeface="Times New Roman" pitchFamily="18" charset="0"/>
+                <a:cs typeface="Times New Roman" pitchFamily="18" charset="0"/>
+              </a:rPr>
+              <a:t>iei</a:t>
+            </a:r>
+            <a:r>
+              <a:rPr lang="ro-RO" sz="2400" b="1" noProof="1" smtClean="0">
+                <a:latin typeface="Times New Roman" pitchFamily="18" charset="0"/>
+                <a:cs typeface="Times New Roman" pitchFamily="18" charset="0"/>
+              </a:rPr>
+              <a:t>,</a:t>
+            </a:r>
+            <a:r>
+              <a:rPr lang="en-US" sz="2400" b="1" noProof="1" smtClean="0">
+                <a:latin typeface="Times New Roman" pitchFamily="18" charset="0"/>
+                <a:cs typeface="Times New Roman" pitchFamily="18" charset="0"/>
+              </a:rPr>
+              <a:t> </a:t>
+            </a:r>
+            <a:r>
+              <a:rPr lang="en-US" sz="2400" b="1" noProof="1" smtClean="0">
+                <a:latin typeface="Times New Roman" pitchFamily="18" charset="0"/>
+                <a:cs typeface="Times New Roman" pitchFamily="18" charset="0"/>
+              </a:rPr>
+              <a:t>parte a </a:t>
+            </a:r>
+            <a:r>
+              <a:rPr lang="en-US" sz="2400" b="1" noProof="1" smtClean="0">
+                <a:latin typeface="Times New Roman" pitchFamily="18" charset="0"/>
+                <a:cs typeface="Times New Roman" pitchFamily="18" charset="0"/>
+              </a:rPr>
+              <a:t>func</a:t>
+            </a:r>
+            <a:r>
+              <a:rPr lang="ro-RO" sz="2400" b="1" noProof="1" smtClean="0">
+                <a:latin typeface="Times New Roman" pitchFamily="18" charset="0"/>
+                <a:cs typeface="Times New Roman" pitchFamily="18" charset="0"/>
+              </a:rPr>
+              <a:t>ţ</a:t>
+            </a:r>
+            <a:r>
+              <a:rPr lang="en-US" sz="2400" b="1" noProof="1" smtClean="0">
+                <a:latin typeface="Times New Roman" pitchFamily="18" charset="0"/>
+                <a:cs typeface="Times New Roman" pitchFamily="18" charset="0"/>
+              </a:rPr>
+              <a:t>ion</a:t>
+            </a:r>
+            <a:r>
+              <a:rPr lang="ro-RO" sz="2400" b="1" noProof="1" smtClean="0">
+                <a:latin typeface="Times New Roman" pitchFamily="18" charset="0"/>
+                <a:cs typeface="Times New Roman" pitchFamily="18" charset="0"/>
+              </a:rPr>
+              <a:t>ă</a:t>
+            </a:r>
+            <a:r>
+              <a:rPr lang="en-US" sz="2400" b="1" noProof="1" smtClean="0">
+                <a:latin typeface="Times New Roman" pitchFamily="18" charset="0"/>
+                <a:cs typeface="Times New Roman" pitchFamily="18" charset="0"/>
+              </a:rPr>
+              <a:t>rii </a:t>
+            </a:r>
+            <a:r>
+              <a:rPr lang="en-US" sz="2400" b="1" noProof="1" smtClean="0">
+                <a:latin typeface="Times New Roman" pitchFamily="18" charset="0"/>
+                <a:cs typeface="Times New Roman" pitchFamily="18" charset="0"/>
+              </a:rPr>
+              <a:t>automate</a:t>
+            </a:r>
+          </a:p>
+          <a:p>
+            <a:r>
+              <a:rPr lang="en-US" sz="2400" b="1" noProof="1" smtClean="0">
+                <a:latin typeface="Times New Roman" pitchFamily="18" charset="0"/>
+                <a:cs typeface="Times New Roman" pitchFamily="18" charset="0"/>
+              </a:rPr>
               <a:t>Categorii de scenarii:</a:t>
             </a:r>
           </a:p>
@@ -3942,7 +4487,23 @@
             <a:pPr lvl="1"/>
             <a:r>
               <a:rPr lang="ro-RO" sz="2200" dirty="0" smtClean="0"/>
-              <a:t>Scenarii pentru testarea cvasicompleta a functionalitatii (scenarii complexe)</a:t>
+              <a:t>Scenarii pentru testarea </a:t>
+            </a:r>
+            <a:r>
+              <a:rPr lang="ro-RO" sz="2200" dirty="0" smtClean="0"/>
+              <a:t>cvasicompletă </a:t>
+            </a:r>
+            <a:r>
+              <a:rPr lang="ro-RO" sz="2200" dirty="0" smtClean="0"/>
+              <a:t>a </a:t>
+            </a:r>
+            <a:r>
+              <a:rPr lang="ro-RO" sz="2200" dirty="0" smtClean="0"/>
+              <a:t>funcţionalităţii </a:t>
+            </a:r>
+            <a:r>
+              <a:rPr lang="ro-RO" sz="2200" dirty="0" smtClean="0"/>
+              <a:t>(scenarii complexe)</a:t>
             </a:r>
             <a:endParaRPr lang="en-US" sz="2200" dirty="0" smtClean="0"/>
           </a:p>
@@ -3958,7 +4519,15 @@
             <a:pPr lvl="1"/>
             <a:r>
               <a:rPr lang="ro-RO" sz="2200" dirty="0" smtClean="0"/>
-              <a:t>Scenarii pentru testarea unor functionalitati specifice ale indicatoarelor</a:t>
+              <a:t>Scenarii pentru testarea unor </a:t>
+            </a:r>
+            <a:r>
+              <a:rPr lang="ro-RO" sz="2200" dirty="0" smtClean="0"/>
+              <a:t>functionalităţi </a:t>
+            </a:r>
+            <a:r>
+              <a:rPr lang="ro-RO" sz="2200" dirty="0" smtClean="0"/>
+              <a:t>specifice ale indicatoarelor</a:t>
             </a:r>
             <a:endParaRPr lang="en-US" sz="2200" b="1" noProof="1" smtClean="0">
               <a:latin typeface="Times New Roman" pitchFamily="18" charset="0"/>
@@ -3980,7 +4549,63 @@
                 <a:latin typeface="Times New Roman" pitchFamily="18" charset="0"/>
                 <a:cs typeface="Times New Roman" pitchFamily="18" charset="0"/>
               </a:rPr>
-              <a:t>Urmarirea dinamica a pasilor</a:t>
+              <a:t>Urm</a:t>
+            </a:r>
+            <a:r>
+              <a:rPr lang="ro-RO" sz="2400" b="1" noProof="1" smtClean="0">
+                <a:latin typeface="Times New Roman" pitchFamily="18" charset="0"/>
+                <a:cs typeface="Times New Roman" pitchFamily="18" charset="0"/>
+              </a:rPr>
+              <a:t>ă</a:t>
+            </a:r>
+            <a:r>
+              <a:rPr lang="en-US" sz="2400" b="1" noProof="1" smtClean="0">
+                <a:latin typeface="Times New Roman" pitchFamily="18" charset="0"/>
+                <a:cs typeface="Times New Roman" pitchFamily="18" charset="0"/>
+              </a:rPr>
+              <a:t>rirea dinamic</a:t>
+            </a:r>
+            <a:r>
+              <a:rPr lang="ro-RO" sz="2400" b="1" noProof="1" smtClean="0">
+                <a:latin typeface="Times New Roman" pitchFamily="18" charset="0"/>
+                <a:cs typeface="Times New Roman" pitchFamily="18" charset="0"/>
+              </a:rPr>
+              <a:t>ă</a:t>
+            </a:r>
+            <a:r>
+              <a:rPr lang="en-US" sz="2400" b="1" noProof="1" smtClean="0">
+                <a:latin typeface="Times New Roman" pitchFamily="18" charset="0"/>
+                <a:cs typeface="Times New Roman" pitchFamily="18" charset="0"/>
+              </a:rPr>
+              <a:t> </a:t>
+            </a:r>
+            <a:r>
+              <a:rPr lang="en-US" sz="2400" b="1" noProof="1" smtClean="0">
+                <a:latin typeface="Times New Roman" pitchFamily="18" charset="0"/>
+                <a:cs typeface="Times New Roman" pitchFamily="18" charset="0"/>
+              </a:rPr>
+              <a:t>a </a:t>
+            </a:r>
+            <a:r>
+              <a:rPr lang="en-US" sz="2400" b="1" noProof="1" smtClean="0">
+                <a:latin typeface="Times New Roman" pitchFamily="18" charset="0"/>
+                <a:cs typeface="Times New Roman" pitchFamily="18" charset="0"/>
+              </a:rPr>
+              <a:t>pa</a:t>
+            </a:r>
+            <a:r>
+              <a:rPr lang="ro-RO" sz="2400" b="1" noProof="1" smtClean="0">
+                <a:latin typeface="Times New Roman" pitchFamily="18" charset="0"/>
+                <a:cs typeface="Times New Roman" pitchFamily="18" charset="0"/>
+              </a:rPr>
+              <a:t>ş</a:t>
+            </a:r>
+            <a:r>
+              <a:rPr lang="en-US" sz="2400" b="1" noProof="1" smtClean="0">
+                <a:latin typeface="Times New Roman" pitchFamily="18" charset="0"/>
+                <a:cs typeface="Times New Roman" pitchFamily="18" charset="0"/>
+              </a:rPr>
+              <a:t>ilor</a:t>
             </a:r>
             <a:endParaRPr lang="en-US" sz="2400" dirty="0" smtClean="0"/>
           </a:p>
@@ -4134,7 +4759,35 @@
                 <a:latin typeface="Times New Roman" pitchFamily="18" charset="0"/>
                 <a:cs typeface="Times New Roman" pitchFamily="18" charset="0"/>
               </a:rPr>
-              <a:t>Ce a urmarit proiectul</a:t>
+              <a:t>Ce a </a:t>
+            </a:r>
+            <a:r>
+              <a:rPr lang="en-US" b="1" noProof="1" smtClean="0">
+                <a:latin typeface="Times New Roman" pitchFamily="18" charset="0"/>
+                <a:cs typeface="Times New Roman" pitchFamily="18" charset="0"/>
+              </a:rPr>
+              <a:t>urm</a:t>
+            </a:r>
+            <a:r>
+              <a:rPr lang="ro-RO" b="1" noProof="1" smtClean="0">
+                <a:latin typeface="Times New Roman" pitchFamily="18" charset="0"/>
+                <a:cs typeface="Times New Roman" pitchFamily="18" charset="0"/>
+              </a:rPr>
+              <a:t>ă</a:t>
+            </a:r>
+            <a:r>
+              <a:rPr lang="en-US" b="1" noProof="1" smtClean="0">
+                <a:latin typeface="Times New Roman" pitchFamily="18" charset="0"/>
+                <a:cs typeface="Times New Roman" pitchFamily="18" charset="0"/>
+              </a:rPr>
+              <a:t>rit </a:t>
+            </a:r>
+            <a:r>
+              <a:rPr lang="en-US" b="1" noProof="1" smtClean="0">
+                <a:latin typeface="Times New Roman" pitchFamily="18" charset="0"/>
+                <a:cs typeface="Times New Roman" pitchFamily="18" charset="0"/>
+              </a:rPr>
+              <a:t>proiectul</a:t>
             </a:r>
           </a:p>
           <a:p>
@@ -4156,12 +4809,30 @@
           <a:p>
             <a:pPr lvl="1"/>
             <a:r>
-              <a:rPr lang="en-US" sz="2800" b="1" noProof="1" smtClean="0">
-                <a:latin typeface="Times New Roman" pitchFamily="18" charset="0"/>
-                <a:cs typeface="Times New Roman" pitchFamily="18" charset="0"/>
-              </a:rPr>
-              <a:t>Testare automata</a:t>
-            </a:r>
+              <a:rPr lang="en-US" b="1" noProof="1" smtClean="0">
+                <a:latin typeface="Times New Roman" pitchFamily="18" charset="0"/>
+                <a:cs typeface="Times New Roman" pitchFamily="18" charset="0"/>
+              </a:rPr>
+              <a:t>Testare </a:t>
+            </a:r>
+            <a:r>
+              <a:rPr lang="en-US" b="1" noProof="1" smtClean="0">
+                <a:latin typeface="Times New Roman" pitchFamily="18" charset="0"/>
+                <a:cs typeface="Times New Roman" pitchFamily="18" charset="0"/>
+              </a:rPr>
+              <a:t>automat</a:t>
+            </a:r>
+            <a:r>
+              <a:rPr lang="ro-RO" b="1" noProof="1" smtClean="0">
+                <a:latin typeface="Times New Roman" pitchFamily="18" charset="0"/>
+                <a:cs typeface="Times New Roman" pitchFamily="18" charset="0"/>
+              </a:rPr>
+              <a:t>ă</a:t>
+            </a:r>
+            <a:endParaRPr lang="en-US" b="1" noProof="1" smtClean="0">
+              <a:latin typeface="Times New Roman" pitchFamily="18" charset="0"/>
+              <a:cs typeface="Times New Roman" pitchFamily="18" charset="0"/>
+            </a:endParaRPr>
           </a:p>
           <a:p>
             <a:pPr lvl="1"/>
@@ -4186,7 +4857,56 @@
                 <a:latin typeface="Times New Roman" pitchFamily="18" charset="0"/>
                 <a:cs typeface="Times New Roman" pitchFamily="18" charset="0"/>
               </a:rPr>
-              <a:t>a functionalitatilor unui computer de bord</a:t>
+              <a:t>a </a:t>
+            </a:r>
+            <a:r>
+              <a:rPr lang="en-US" sz="2400" noProof="1" smtClean="0">
+                <a:latin typeface="Times New Roman" pitchFamily="18" charset="0"/>
+                <a:cs typeface="Times New Roman" pitchFamily="18" charset="0"/>
+              </a:rPr>
+              <a:t>func</a:t>
+            </a:r>
+            <a:r>
+              <a:rPr lang="ro-RO" sz="2400" noProof="1" smtClean="0">
+                <a:latin typeface="Times New Roman" pitchFamily="18" charset="0"/>
+                <a:cs typeface="Times New Roman" pitchFamily="18" charset="0"/>
+              </a:rPr>
+              <a:t>ţ</a:t>
+            </a:r>
+            <a:r>
+              <a:rPr lang="en-US" sz="2400" noProof="1" smtClean="0">
+                <a:latin typeface="Times New Roman" pitchFamily="18" charset="0"/>
+                <a:cs typeface="Times New Roman" pitchFamily="18" charset="0"/>
+              </a:rPr>
+              <a:t>ionalit</a:t>
+            </a:r>
+            <a:r>
+              <a:rPr lang="ro-RO" sz="2400" noProof="1" smtClean="0">
+                <a:latin typeface="Times New Roman" pitchFamily="18" charset="0"/>
+                <a:cs typeface="Times New Roman" pitchFamily="18" charset="0"/>
+              </a:rPr>
+              <a:t>ă</a:t>
+            </a:r>
+            <a:r>
+              <a:rPr lang="ro-RO" sz="2400" noProof="1" smtClean="0">
+                <a:latin typeface="Times New Roman" pitchFamily="18" charset="0"/>
+                <a:cs typeface="Times New Roman" pitchFamily="18" charset="0"/>
+              </a:rPr>
+              <a:t>ţ</a:t>
+            </a:r>
+            <a:r>
+              <a:rPr lang="en-US" sz="2400" noProof="1" smtClean="0">
+                <a:latin typeface="Times New Roman" pitchFamily="18" charset="0"/>
+                <a:cs typeface="Times New Roman" pitchFamily="18" charset="0"/>
+              </a:rPr>
+              <a:t>ilor </a:t>
+            </a:r>
+            <a:r>
+              <a:rPr lang="en-US" sz="2400" noProof="1" smtClean="0">
+                <a:latin typeface="Times New Roman" pitchFamily="18" charset="0"/>
+                <a:cs typeface="Times New Roman" pitchFamily="18" charset="0"/>
+              </a:rPr>
+              <a:t>unui computer de bord</a:t>
             </a:r>
           </a:p>
           <a:p>
@@ -4204,7 +4924,28 @@
                 <a:latin typeface="Times New Roman" pitchFamily="18" charset="0"/>
                 <a:cs typeface="Times New Roman" pitchFamily="18" charset="0"/>
               </a:rPr>
-              <a:t>Dezvoltari viitoare</a:t>
+              <a:t>Dezvolt</a:t>
+            </a:r>
+            <a:r>
+              <a:rPr lang="ro-RO" b="1" noProof="1" smtClean="0">
+                <a:latin typeface="Times New Roman" pitchFamily="18" charset="0"/>
+                <a:cs typeface="Times New Roman" pitchFamily="18" charset="0"/>
+              </a:rPr>
+              <a:t>ă</a:t>
+            </a:r>
+            <a:r>
+              <a:rPr lang="en-US" b="1" noProof="1" smtClean="0">
+                <a:latin typeface="Times New Roman" pitchFamily="18" charset="0"/>
+                <a:cs typeface="Times New Roman" pitchFamily="18" charset="0"/>
+              </a:rPr>
+              <a:t>ri </a:t>
+            </a:r>
+            <a:r>
+              <a:rPr lang="en-US" b="1" noProof="1" smtClean="0">
+                <a:latin typeface="Times New Roman" pitchFamily="18" charset="0"/>
+                <a:cs typeface="Times New Roman" pitchFamily="18" charset="0"/>
+              </a:rPr>
+              <a:t>viitoare</a:t>
             </a:r>
           </a:p>
         </p:txBody>
@@ -4382,7 +5123,35 @@
                 <a:latin typeface="Times New Roman" pitchFamily="18" charset="0"/>
                 <a:cs typeface="Times New Roman" pitchFamily="18" charset="0"/>
               </a:rPr>
-              <a:t>Programare orientata pe obiecte</a:t>
+              <a:t>Programare </a:t>
+            </a:r>
+            <a:r>
+              <a:rPr lang="en-US" noProof="1" smtClean="0">
+                <a:latin typeface="Times New Roman" pitchFamily="18" charset="0"/>
+                <a:cs typeface="Times New Roman" pitchFamily="18" charset="0"/>
+              </a:rPr>
+              <a:t>orientat</a:t>
+            </a:r>
+            <a:r>
+              <a:rPr lang="ro-RO" noProof="1" smtClean="0">
+                <a:latin typeface="Times New Roman" pitchFamily="18" charset="0"/>
+                <a:cs typeface="Times New Roman" pitchFamily="18" charset="0"/>
+              </a:rPr>
+              <a:t>ă</a:t>
+            </a:r>
+            <a:r>
+              <a:rPr lang="en-US" noProof="1" smtClean="0">
+                <a:latin typeface="Times New Roman" pitchFamily="18" charset="0"/>
+                <a:cs typeface="Times New Roman" pitchFamily="18" charset="0"/>
+              </a:rPr>
+              <a:t> </a:t>
+            </a:r>
+            <a:r>
+              <a:rPr lang="en-US" noProof="1" smtClean="0">
+                <a:latin typeface="Times New Roman" pitchFamily="18" charset="0"/>
+                <a:cs typeface="Times New Roman" pitchFamily="18" charset="0"/>
+              </a:rPr>
+              <a:t>pe obiecte</a:t>
             </a:r>
           </a:p>
           <a:p>
@@ -4466,7 +5235,42 @@
                 <a:latin typeface="Times New Roman" pitchFamily="18" charset="0"/>
                 <a:cs typeface="Times New Roman" pitchFamily="18" charset="0"/>
               </a:rPr>
-              <a:t>Interfata grafica cu utilizatorul</a:t>
+              <a:t>Interfa</a:t>
+            </a:r>
+            <a:r>
+              <a:rPr lang="ro-RO" noProof="1" smtClean="0">
+                <a:latin typeface="Times New Roman" pitchFamily="18" charset="0"/>
+                <a:cs typeface="Times New Roman" pitchFamily="18" charset="0"/>
+              </a:rPr>
+              <a:t>ţ</a:t>
+            </a:r>
+            <a:r>
+              <a:rPr lang="en-US" noProof="1" smtClean="0">
+                <a:latin typeface="Times New Roman" pitchFamily="18" charset="0"/>
+                <a:cs typeface="Times New Roman" pitchFamily="18" charset="0"/>
+              </a:rPr>
+              <a:t>a grafic</a:t>
+            </a:r>
+            <a:r>
+              <a:rPr lang="ro-RO" noProof="1" smtClean="0">
+                <a:latin typeface="Times New Roman" pitchFamily="18" charset="0"/>
+                <a:cs typeface="Times New Roman" pitchFamily="18" charset="0"/>
+              </a:rPr>
+              <a:t>ă</a:t>
+            </a:r>
+            <a:r>
+              <a:rPr lang="en-US" noProof="1" smtClean="0">
+                <a:latin typeface="Times New Roman" pitchFamily="18" charset="0"/>
+                <a:cs typeface="Times New Roman" pitchFamily="18" charset="0"/>
+              </a:rPr>
+              <a:t> </a:t>
+            </a:r>
+            <a:r>
+              <a:rPr lang="en-US" noProof="1" smtClean="0">
+                <a:latin typeface="Times New Roman" pitchFamily="18" charset="0"/>
+                <a:cs typeface="Times New Roman" pitchFamily="18" charset="0"/>
+              </a:rPr>
+              <a:t>cu utilizatorul</a:t>
             </a:r>
           </a:p>
           <a:p>
@@ -4817,7 +5621,21 @@
                 <a:latin typeface="Times New Roman" pitchFamily="18" charset="0"/>
                 <a:cs typeface="Times New Roman" pitchFamily="18" charset="0"/>
               </a:rPr>
-              <a:t>Round-Robin cu intreruperi	</a:t>
+              <a:t>Round-Robin cu </a:t>
+            </a:r>
+            <a:r>
+              <a:rPr lang="ro-RO" noProof="1" smtClean="0">
+                <a:latin typeface="Times New Roman" pitchFamily="18" charset="0"/>
+                <a:cs typeface="Times New Roman" pitchFamily="18" charset="0"/>
+              </a:rPr>
+              <a:t>întreruperi</a:t>
+            </a:r>
+            <a:r>
+              <a:rPr lang="ro-RO" noProof="1" smtClean="0">
+                <a:latin typeface="Times New Roman" pitchFamily="18" charset="0"/>
+                <a:cs typeface="Times New Roman" pitchFamily="18" charset="0"/>
+              </a:rPr>
+              <a:t>	</a:t>
             </a:r>
           </a:p>
           <a:p>
@@ -4850,7 +5668,35 @@
                 <a:latin typeface="Times New Roman" pitchFamily="18" charset="0"/>
                 <a:cs typeface="Times New Roman" pitchFamily="18" charset="0"/>
               </a:rPr>
-              <a:t>Problema partajarii datelor</a:t>
+              <a:t>Problema </a:t>
+            </a:r>
+            <a:r>
+              <a:rPr lang="en-US" b="1" noProof="1" smtClean="0">
+                <a:latin typeface="Times New Roman" pitchFamily="18" charset="0"/>
+                <a:cs typeface="Times New Roman" pitchFamily="18" charset="0"/>
+              </a:rPr>
+              <a:t>partaj</a:t>
+            </a:r>
+            <a:r>
+              <a:rPr lang="ro-RO" b="1" noProof="1" smtClean="0">
+                <a:latin typeface="Times New Roman" pitchFamily="18" charset="0"/>
+                <a:cs typeface="Times New Roman" pitchFamily="18" charset="0"/>
+              </a:rPr>
+              <a:t>ă</a:t>
+            </a:r>
+            <a:r>
+              <a:rPr lang="en-US" b="1" noProof="1" smtClean="0">
+                <a:latin typeface="Times New Roman" pitchFamily="18" charset="0"/>
+                <a:cs typeface="Times New Roman" pitchFamily="18" charset="0"/>
+              </a:rPr>
+              <a:t>rii </a:t>
+            </a:r>
+            <a:r>
+              <a:rPr lang="en-US" b="1" noProof="1" smtClean="0">
+                <a:latin typeface="Times New Roman" pitchFamily="18" charset="0"/>
+                <a:cs typeface="Times New Roman" pitchFamily="18" charset="0"/>
+              </a:rPr>
+              <a:t>datelor</a:t>
             </a:r>
           </a:p>
           <a:p>
@@ -4998,7 +5844,21 @@
                 <a:latin typeface="Times New Roman" pitchFamily="18" charset="0"/>
                 <a:cs typeface="Times New Roman" pitchFamily="18" charset="0"/>
               </a:rPr>
-              <a:t>Programarea orientata pe obiecte</a:t>
+              <a:t>Programarea </a:t>
+            </a:r>
+            <a:r>
+              <a:rPr lang="ro-RO" b="1" noProof="1" smtClean="0">
+                <a:latin typeface="Times New Roman" pitchFamily="18" charset="0"/>
+                <a:cs typeface="Times New Roman" pitchFamily="18" charset="0"/>
+              </a:rPr>
+              <a:t>orientată </a:t>
+            </a:r>
+            <a:r>
+              <a:rPr lang="ro-RO" b="1" noProof="1" smtClean="0">
+                <a:latin typeface="Times New Roman" pitchFamily="18" charset="0"/>
+                <a:cs typeface="Times New Roman" pitchFamily="18" charset="0"/>
+              </a:rPr>
+              <a:t>pe obiecte</a:t>
             </a:r>
           </a:p>
           <a:p>
@@ -5198,7 +6058,28 @@
                 <a:latin typeface="Times New Roman" pitchFamily="18" charset="0"/>
                 <a:cs typeface="Times New Roman" pitchFamily="18" charset="0"/>
               </a:rPr>
-              <a:t>Clase si obiecte</a:t>
+              <a:t>Clase </a:t>
+            </a:r>
+            <a:r>
+              <a:rPr lang="ro-RO" b="1" noProof="1" smtClean="0">
+                <a:latin typeface="Times New Roman" pitchFamily="18" charset="0"/>
+                <a:cs typeface="Times New Roman" pitchFamily="18" charset="0"/>
+              </a:rPr>
+              <a:t>ş</a:t>
+            </a:r>
+            <a:r>
+              <a:rPr lang="en-US" b="1" noProof="1" smtClean="0">
+                <a:latin typeface="Times New Roman" pitchFamily="18" charset="0"/>
+                <a:cs typeface="Times New Roman" pitchFamily="18" charset="0"/>
+              </a:rPr>
+              <a:t>i </a:t>
+            </a:r>
+            <a:r>
+              <a:rPr lang="en-US" b="1" noProof="1" smtClean="0">
+                <a:latin typeface="Times New Roman" pitchFamily="18" charset="0"/>
+                <a:cs typeface="Times New Roman" pitchFamily="18" charset="0"/>
+              </a:rPr>
+              <a:t>obiecte</a:t>
             </a:r>
           </a:p>
           <a:p>
@@ -5213,7 +6094,28 @@
                 <a:latin typeface="Times New Roman" pitchFamily="18" charset="0"/>
                 <a:cs typeface="Times New Roman" pitchFamily="18" charset="0"/>
               </a:rPr>
-              <a:t>Comunicarea intre obiecte</a:t>
+              <a:t>Comunicarea </a:t>
+            </a:r>
+            <a:r>
+              <a:rPr lang="ro-RO" b="1" noProof="1" smtClean="0">
+                <a:latin typeface="Times New Roman" pitchFamily="18" charset="0"/>
+                <a:cs typeface="Times New Roman" pitchFamily="18" charset="0"/>
+              </a:rPr>
+              <a:t>î</a:t>
+            </a:r>
+            <a:r>
+              <a:rPr lang="en-US" b="1" noProof="1" smtClean="0">
+                <a:latin typeface="Times New Roman" pitchFamily="18" charset="0"/>
+                <a:cs typeface="Times New Roman" pitchFamily="18" charset="0"/>
+              </a:rPr>
+              <a:t>ntre </a:t>
+            </a:r>
+            <a:r>
+              <a:rPr lang="en-US" b="1" noProof="1" smtClean="0">
+                <a:latin typeface="Times New Roman" pitchFamily="18" charset="0"/>
+                <a:cs typeface="Times New Roman" pitchFamily="18" charset="0"/>
+              </a:rPr>
+              <a:t>obiecte</a:t>
             </a:r>
           </a:p>
           <a:p>
@@ -5369,7 +6271,14 @@
                 <a:latin typeface="Times New Roman" pitchFamily="18" charset="0"/>
                 <a:cs typeface="Times New Roman" pitchFamily="18" charset="0"/>
               </a:rPr>
-              <a:t>Modelul relational</a:t>
+              <a:t>Modelul </a:t>
+            </a:r>
+            <a:r>
+              <a:rPr lang="ro-RO" b="1" noProof="1" smtClean="0">
+                <a:latin typeface="Times New Roman" pitchFamily="18" charset="0"/>
+                <a:cs typeface="Times New Roman" pitchFamily="18" charset="0"/>
+              </a:rPr>
+              <a:t>relaţional</a:t>
             </a:r>
             <a:endParaRPr lang="en-US" b="1" noProof="1" smtClean="0">
               <a:latin typeface="Times New Roman" pitchFamily="18" charset="0"/>
@@ -5388,23 +6297,80 @@
                 <a:latin typeface="Times New Roman" pitchFamily="18" charset="0"/>
                 <a:cs typeface="Times New Roman" pitchFamily="18" charset="0"/>
               </a:rPr>
-              <a:t>Algebra relationala</a:t>
-            </a:r>
-          </a:p>
-          <a:p>
+              <a:t>Algebra </a:t>
+            </a:r>
+            <a:r>
+              <a:rPr lang="en-US" b="1" noProof="1" smtClean="0">
+                <a:latin typeface="Times New Roman" pitchFamily="18" charset="0"/>
+                <a:cs typeface="Times New Roman" pitchFamily="18" charset="0"/>
+              </a:rPr>
+              <a:t>rela</a:t>
+            </a:r>
+            <a:r>
+              <a:rPr lang="ro-RO" b="1" noProof="1" smtClean="0">
+                <a:latin typeface="Times New Roman" pitchFamily="18" charset="0"/>
+                <a:cs typeface="Times New Roman" pitchFamily="18" charset="0"/>
+              </a:rPr>
+              <a:t>ţ</a:t>
+            </a:r>
+            <a:r>
+              <a:rPr lang="en-US" b="1" noProof="1" smtClean="0">
+                <a:latin typeface="Times New Roman" pitchFamily="18" charset="0"/>
+                <a:cs typeface="Times New Roman" pitchFamily="18" charset="0"/>
+              </a:rPr>
+              <a:t>ional</a:t>
+            </a:r>
+            <a:r>
+              <a:rPr lang="ro-RO" b="1" noProof="1" smtClean="0">
+                <a:latin typeface="Times New Roman" pitchFamily="18" charset="0"/>
+                <a:cs typeface="Times New Roman" pitchFamily="18" charset="0"/>
+              </a:rPr>
+              <a:t>ă</a:t>
+            </a:r>
             <a:endParaRPr lang="en-US" b="1" noProof="1" smtClean="0">
               <a:latin typeface="Times New Roman" pitchFamily="18" charset="0"/>
               <a:cs typeface="Times New Roman" pitchFamily="18" charset="0"/>
             </a:endParaRPr>
           </a:p>
           <a:p>
+            <a:endParaRPr lang="en-US" b="1" noProof="1" smtClean="0">
+              <a:latin typeface="Times New Roman" pitchFamily="18" charset="0"/>
+              <a:cs typeface="Times New Roman" pitchFamily="18" charset="0"/>
+            </a:endParaRPr>
+          </a:p>
+          <a:p>
             <a:r>
               <a:rPr lang="en-US" b="1" noProof="1" smtClean="0">
                 <a:latin typeface="Times New Roman" pitchFamily="18" charset="0"/>
                 <a:cs typeface="Times New Roman" pitchFamily="18" charset="0"/>
               </a:rPr>
-              <a:t>Calculul relational</a:t>
-            </a:r>
+              <a:t>Calculul </a:t>
+            </a:r>
+            <a:r>
+              <a:rPr lang="en-US" b="1" noProof="1" smtClean="0">
+                <a:latin typeface="Times New Roman" pitchFamily="18" charset="0"/>
+                <a:cs typeface="Times New Roman" pitchFamily="18" charset="0"/>
+              </a:rPr>
+              <a:t>rela</a:t>
+            </a:r>
+            <a:r>
+              <a:rPr lang="ro-RO" b="1" noProof="1" smtClean="0">
+                <a:latin typeface="Times New Roman" pitchFamily="18" charset="0"/>
+                <a:cs typeface="Times New Roman" pitchFamily="18" charset="0"/>
+              </a:rPr>
+              <a:t>ţ</a:t>
+            </a:r>
+            <a:r>
+              <a:rPr lang="en-US" b="1" noProof="1" smtClean="0">
+                <a:latin typeface="Times New Roman" pitchFamily="18" charset="0"/>
+                <a:cs typeface="Times New Roman" pitchFamily="18" charset="0"/>
+              </a:rPr>
+              <a:t>ional</a:t>
+            </a:r>
+            <a:endParaRPr lang="en-US" b="1" noProof="1" smtClean="0">
+              <a:latin typeface="Times New Roman" pitchFamily="18" charset="0"/>
+              <a:cs typeface="Times New Roman" pitchFamily="18" charset="0"/>
+            </a:endParaRPr>
           </a:p>
           <a:p>
             <a:endParaRPr lang="en-US" b="1" noProof="1" smtClean="0">
@@ -5593,26 +6559,61 @@
                 <a:latin typeface="Times New Roman" pitchFamily="18" charset="0"/>
                 <a:cs typeface="Times New Roman" pitchFamily="18" charset="0"/>
               </a:rPr>
-              <a:t>Informatii generale</a:t>
-            </a:r>
-          </a:p>
-          <a:p>
+              <a:t>Informa</a:t>
+            </a:r>
+            <a:r>
+              <a:rPr lang="ro-RO" b="1" noProof="1" smtClean="0">
+                <a:latin typeface="Times New Roman" pitchFamily="18" charset="0"/>
+                <a:cs typeface="Times New Roman" pitchFamily="18" charset="0"/>
+              </a:rPr>
+              <a:t>ţ</a:t>
+            </a:r>
             <a:r>
               <a:rPr lang="en-US" b="1" noProof="1" smtClean="0">
                 <a:latin typeface="Times New Roman" pitchFamily="18" charset="0"/>
                 <a:cs typeface="Times New Roman" pitchFamily="18" charset="0"/>
               </a:rPr>
+              <a:t>ii </a:t>
+            </a:r>
+            <a:r>
+              <a:rPr lang="en-US" b="1" noProof="1" smtClean="0">
+                <a:latin typeface="Times New Roman" pitchFamily="18" charset="0"/>
+                <a:cs typeface="Times New Roman" pitchFamily="18" charset="0"/>
+              </a:rPr>
+              <a:t>generale</a:t>
+            </a:r>
+          </a:p>
+          <a:p>
+            <a:r>
+              <a:rPr lang="en-US" b="1" noProof="1" smtClean="0">
+                <a:latin typeface="Times New Roman" pitchFamily="18" charset="0"/>
+                <a:cs typeface="Times New Roman" pitchFamily="18" charset="0"/>
+              </a:rPr>
               <a:t>Istoric</a:t>
             </a:r>
           </a:p>
           <a:p>
             <a:pPr lvl="1"/>
             <a:r>
+              <a:rPr lang="ro-RO" noProof="1" smtClean="0">
+                <a:latin typeface="Times New Roman" pitchFamily="18" charset="0"/>
+                <a:cs typeface="Times New Roman" pitchFamily="18" charset="0"/>
+              </a:rPr>
+              <a:t>Î</a:t>
+            </a:r>
+            <a:r>
               <a:rPr lang="en-US" noProof="1" smtClean="0">
                 <a:latin typeface="Times New Roman" pitchFamily="18" charset="0"/>
                 <a:cs typeface="Times New Roman" pitchFamily="18" charset="0"/>
               </a:rPr>
-              <a:t>Inainte de UML 1.x</a:t>
+              <a:t>nainte </a:t>
+            </a:r>
+            <a:r>
+              <a:rPr lang="en-US" noProof="1" smtClean="0">
+                <a:latin typeface="Times New Roman" pitchFamily="18" charset="0"/>
+                <a:cs typeface="Times New Roman" pitchFamily="18" charset="0"/>
+              </a:rPr>
+              <a:t>de UML 1.x</a:t>
             </a:r>
           </a:p>
           <a:p>
@@ -5622,7 +6623,35 @@
                 <a:latin typeface="Times New Roman" pitchFamily="18" charset="0"/>
                 <a:cs typeface="Times New Roman" pitchFamily="18" charset="0"/>
               </a:rPr>
-              <a:t>Dezvoltarea catre UML 2.0</a:t>
+              <a:t>Dezvoltarea </a:t>
+            </a:r>
+            <a:r>
+              <a:rPr lang="en-US" noProof="1" smtClean="0">
+                <a:latin typeface="Times New Roman" pitchFamily="18" charset="0"/>
+                <a:cs typeface="Times New Roman" pitchFamily="18" charset="0"/>
+              </a:rPr>
+              <a:t>c</a:t>
+            </a:r>
+            <a:r>
+              <a:rPr lang="ro-RO" noProof="1" smtClean="0">
+                <a:latin typeface="Times New Roman" pitchFamily="18" charset="0"/>
+                <a:cs typeface="Times New Roman" pitchFamily="18" charset="0"/>
+              </a:rPr>
+              <a:t>ă</a:t>
+            </a:r>
+            <a:r>
+              <a:rPr lang="en-US" noProof="1" smtClean="0">
+                <a:latin typeface="Times New Roman" pitchFamily="18" charset="0"/>
+                <a:cs typeface="Times New Roman" pitchFamily="18" charset="0"/>
+              </a:rPr>
+              <a:t>tre </a:t>
+            </a:r>
+            <a:r>
+              <a:rPr lang="en-US" noProof="1" smtClean="0">
+                <a:latin typeface="Times New Roman" pitchFamily="18" charset="0"/>
+                <a:cs typeface="Times New Roman" pitchFamily="18" charset="0"/>
+              </a:rPr>
+              <a:t>UML 2.0</a:t>
             </a:r>
           </a:p>
           <a:p>
@@ -5828,7 +6857,35 @@
                 <a:latin typeface="Times New Roman" pitchFamily="18" charset="0"/>
                 <a:cs typeface="Times New Roman" pitchFamily="18" charset="0"/>
               </a:rPr>
-              <a:t>Infrastructura interfetei cu utilizatorul</a:t>
+              <a:t>Infrastructura </a:t>
+            </a:r>
+            <a:r>
+              <a:rPr lang="en-US" b="1" noProof="1" smtClean="0">
+                <a:latin typeface="Times New Roman" pitchFamily="18" charset="0"/>
+                <a:cs typeface="Times New Roman" pitchFamily="18" charset="0"/>
+              </a:rPr>
+              <a:t>interfe</a:t>
+            </a:r>
+            <a:r>
+              <a:rPr lang="ro-RO" b="1" noProof="1" smtClean="0">
+                <a:latin typeface="Times New Roman" pitchFamily="18" charset="0"/>
+                <a:cs typeface="Times New Roman" pitchFamily="18" charset="0"/>
+              </a:rPr>
+              <a:t>ţ</a:t>
+            </a:r>
+            <a:r>
+              <a:rPr lang="en-US" b="1" noProof="1" smtClean="0">
+                <a:latin typeface="Times New Roman" pitchFamily="18" charset="0"/>
+                <a:cs typeface="Times New Roman" pitchFamily="18" charset="0"/>
+              </a:rPr>
+              <a:t>ei </a:t>
+            </a:r>
+            <a:r>
+              <a:rPr lang="en-US" b="1" noProof="1" smtClean="0">
+                <a:latin typeface="Times New Roman" pitchFamily="18" charset="0"/>
+                <a:cs typeface="Times New Roman" pitchFamily="18" charset="0"/>
+              </a:rPr>
+              <a:t>cu utilizatorul</a:t>
             </a:r>
           </a:p>
           <a:p>

</xml_diff>